<commit_message>
Update Servlets Day 1.
</commit_message>
<xml_diff>
--- a/Servlets/Day1/Docs/Web Presentation-Part1.pptx
+++ b/Servlets/Day1/Docs/Web Presentation-Part1.pptx
@@ -256,7 +256,7 @@
           <a:p>
             <a:fld id="{4F94E7C4-328C-457B-8CA2-EE381C323794}" type="datetimeFigureOut">
               <a:rPr lang="en-US" smtClean="0"/>
-              <a:t>7/14/2017</a:t>
+              <a:t>7/18/2017</a:t>
             </a:fld>
             <a:endParaRPr lang="en-US"/>
           </a:p>
@@ -6440,7 +6440,7 @@
             <a:fld id="{0DDD1723-F08C-BC4A-A158-087EDAF93B47}" type="datetimeFigureOut">
               <a:rPr lang="en-US"/>
               <a:pPr/>
-              <a:t>7/14/2017</a:t>
+              <a:t>7/18/2017</a:t>
             </a:fld>
             <a:endParaRPr lang="en-US"/>
           </a:p>
@@ -7879,116 +7879,116 @@
           <a:p>
             <a:pPr algn="l"/>
             <a:r>
-              <a:rPr lang="en-US" b="1" dirty="0"/>
+              <a:rPr lang="en-US" sz="2000" b="1" dirty="0"/>
               <a:t>Apache Tomcat</a:t>
             </a:r>
             <a:r>
-              <a:rPr lang="en-US" dirty="0"/>
+              <a:rPr lang="en-US" sz="2000" dirty="0"/>
               <a:t> </a:t>
             </a:r>
             <a:r>
-              <a:rPr lang="en-US" dirty="0" smtClean="0"/>
+              <a:rPr lang="en-US" sz="2000" dirty="0" smtClean="0"/>
               <a:t>is </a:t>
             </a:r>
             <a:r>
-              <a:rPr lang="en-US" dirty="0"/>
+              <a:rPr lang="en-US" sz="2000" dirty="0"/>
               <a:t>an open source </a:t>
             </a:r>
             <a:r>
-              <a:rPr lang="en-US" b="1" dirty="0"/>
+              <a:rPr lang="en-US" sz="2000" b="1" dirty="0"/>
               <a:t>web server</a:t>
             </a:r>
             <a:r>
-              <a:rPr lang="en-US" dirty="0"/>
+              <a:rPr lang="en-US" sz="2000" dirty="0"/>
               <a:t> and </a:t>
             </a:r>
             <a:r>
-              <a:rPr lang="en-US" b="1" dirty="0"/>
+              <a:rPr lang="en-US" sz="2000" b="1" dirty="0"/>
               <a:t>servlet </a:t>
             </a:r>
             <a:r>
-              <a:rPr lang="en-US" b="1" dirty="0" smtClean="0"/>
+              <a:rPr lang="en-US" sz="2000" b="1" dirty="0" smtClean="0"/>
               <a:t>container</a:t>
             </a:r>
           </a:p>
           <a:p>
             <a:pPr algn="l"/>
-            <a:endParaRPr lang="en-US" dirty="0"/>
+            <a:endParaRPr lang="en-US" sz="2000" dirty="0"/>
           </a:p>
           <a:p>
             <a:pPr algn="l"/>
             <a:r>
-              <a:rPr lang="en-US" dirty="0" smtClean="0"/>
+              <a:rPr lang="en-US" sz="2000" dirty="0" smtClean="0"/>
               <a:t>Tomcat </a:t>
             </a:r>
             <a:r>
-              <a:rPr lang="en-US" dirty="0"/>
+              <a:rPr lang="en-US" sz="2000" dirty="0"/>
               <a:t>implements the Java Servlet and the JavaServer Pages (JSP) specifications from Oracle, and provides a "pure Java" </a:t>
             </a:r>
             <a:r>
-              <a:rPr lang="en-US" b="1" dirty="0"/>
+              <a:rPr lang="en-US" sz="2000" b="1" dirty="0"/>
               <a:t>HTTP</a:t>
             </a:r>
             <a:r>
-              <a:rPr lang="en-US" dirty="0"/>
+              <a:rPr lang="en-US" sz="2000" dirty="0"/>
               <a:t> web server environment </a:t>
             </a:r>
             <a:r>
-              <a:rPr lang="en-US" dirty="0" smtClean="0"/>
+              <a:rPr lang="en-US" sz="2000" dirty="0" smtClean="0"/>
               <a:t>for Java</a:t>
             </a:r>
             <a:r>
-              <a:rPr lang="en-US" dirty="0"/>
+              <a:rPr lang="en-US" sz="2000" dirty="0"/>
               <a:t> code to run </a:t>
             </a:r>
             <a:r>
-              <a:rPr lang="en-US" dirty="0" smtClean="0"/>
+              <a:rPr lang="en-US" sz="2000" dirty="0" smtClean="0"/>
               <a:t>in. </a:t>
             </a:r>
           </a:p>
           <a:p>
             <a:pPr algn="l"/>
-            <a:endParaRPr lang="en-US" dirty="0"/>
+            <a:endParaRPr lang="en-US" sz="2000" dirty="0"/>
           </a:p>
           <a:p>
             <a:pPr algn="l"/>
             <a:r>
-              <a:rPr lang="en-US" dirty="0" smtClean="0"/>
+              <a:rPr lang="en-US" sz="2000" dirty="0" smtClean="0"/>
               <a:t>In the simplest configuration Tomcat runs in a single operating system </a:t>
             </a:r>
             <a:r>
-              <a:rPr lang="en-US" b="1" dirty="0" smtClean="0"/>
+              <a:rPr lang="en-US" sz="2000" b="1" dirty="0" smtClean="0"/>
               <a:t>process</a:t>
             </a:r>
             <a:r>
-              <a:rPr lang="en-US" dirty="0" smtClean="0"/>
+              <a:rPr lang="en-US" sz="2000" dirty="0" smtClean="0"/>
               <a:t>. The </a:t>
             </a:r>
             <a:r>
-              <a:rPr lang="en-US" dirty="0"/>
+              <a:rPr lang="en-US" sz="2000" dirty="0"/>
               <a:t>process runs a Java virtual machine (JVM). Every single HTTP request from a browser to Tomcat is processed in the Tomcat process in a separate thread</a:t>
             </a:r>
             <a:r>
-              <a:rPr lang="en-US" dirty="0" smtClean="0"/>
+              <a:rPr lang="en-US" sz="2000" dirty="0" smtClean="0"/>
               <a:t>.</a:t>
             </a:r>
           </a:p>
           <a:p>
             <a:pPr algn="l"/>
-            <a:endParaRPr lang="en-US" dirty="0"/>
+            <a:endParaRPr lang="en-US" sz="2000" dirty="0"/>
           </a:p>
           <a:p>
             <a:pPr algn="l"/>
             <a:r>
-              <a:rPr lang="en-US" dirty="0"/>
+              <a:rPr lang="en-US" sz="2000" dirty="0"/>
               <a:t>Apache Tomcat includes tools for configuration and management, but can also be configured by editing </a:t>
             </a:r>
             <a:r>
-              <a:rPr lang="en-US" b="1" dirty="0"/>
+              <a:rPr lang="en-US" sz="2000" b="1" dirty="0"/>
               <a:t>XML</a:t>
             </a:r>
             <a:r>
-              <a:rPr lang="en-US" dirty="0"/>
+              <a:rPr lang="en-US" sz="2000" dirty="0"/>
               <a:t> configuration files.</a:t>
             </a:r>
           </a:p>
@@ -8108,7 +8108,7 @@
         <p:spPr>
           <a:xfrm>
             <a:off x="703172" y="1719840"/>
-            <a:ext cx="7725128" cy="923330"/>
+            <a:ext cx="7725128" cy="1015663"/>
           </a:xfrm>
           <a:prstGeom prst="rect">
             <a:avLst/>
@@ -8125,25 +8125,25 @@
               <a:buChar char="•"/>
             </a:pPr>
             <a:r>
-              <a:rPr lang="en-US" dirty="0"/>
+              <a:rPr lang="en-US" sz="2000" dirty="0"/>
               <a:t>Open </a:t>
             </a:r>
             <a:r>
-              <a:rPr lang="en-US" dirty="0" smtClean="0"/>
+              <a:rPr lang="en-US" sz="2000" dirty="0" smtClean="0"/>
               <a:t>file Workshop 1 - Server </a:t>
             </a:r>
             <a:r>
-              <a:rPr lang="en-US" dirty="0"/>
+              <a:rPr lang="en-US" sz="2000" dirty="0"/>
               <a:t>configuration.docx</a:t>
             </a:r>
-            <a:endParaRPr lang="en-US" dirty="0" smtClean="0"/>
+            <a:endParaRPr lang="en-US" sz="2000" dirty="0" smtClean="0"/>
           </a:p>
           <a:p>
             <a:pPr marL="285750" indent="-285750">
               <a:buFont typeface="Arial" panose="020B0604020202020204" pitchFamily="34" charset="0"/>
               <a:buChar char="•"/>
             </a:pPr>
-            <a:endParaRPr lang="en-US" b="1" dirty="0" smtClean="0"/>
+            <a:endParaRPr lang="en-US" sz="2000" b="1" dirty="0" smtClean="0"/>
           </a:p>
           <a:p>
             <a:pPr marL="285750" indent="-285750">
@@ -8151,10 +8151,10 @@
               <a:buChar char="•"/>
             </a:pPr>
             <a:r>
-              <a:rPr lang="en-US" dirty="0" smtClean="0"/>
+              <a:rPr lang="en-US" sz="2000" dirty="0" smtClean="0"/>
               <a:t>Begin workshop </a:t>
             </a:r>
-            <a:endParaRPr lang="en-US" dirty="0"/>
+            <a:endParaRPr lang="en-US" sz="2000" dirty="0"/>
           </a:p>
         </p:txBody>
       </p:sp>
@@ -8363,16 +8363,20 @@
         <p:spPr/>
         <p:txBody>
           <a:bodyPr>
-            <a:normAutofit/>
+            <a:normAutofit lnSpcReduction="10000"/>
           </a:bodyPr>
           <a:lstStyle/>
           <a:p>
-            <a:endParaRPr lang="en-US" dirty="0" smtClean="0"/>
-          </a:p>
-          <a:p>
-            <a:r>
-              <a:rPr lang="en-US" dirty="0"/>
-              <a:t>Maven standardizes the sources structure of a web application</a:t>
+            <a:endParaRPr lang="en-US" sz="2000" dirty="0" smtClean="0"/>
+          </a:p>
+          <a:p>
+            <a:r>
+              <a:rPr lang="en-US" sz="2000" dirty="0" smtClean="0"/>
+              <a:t>Maven </a:t>
+            </a:r>
+            <a:r>
+              <a:rPr lang="en-US" sz="2000" dirty="0"/>
+              <a:t>standardizes the sources structure of a web application</a:t>
             </a:r>
           </a:p>
           <a:p>
@@ -8497,7 +8501,7 @@
         </p:blipFill>
         <p:spPr>
           <a:xfrm>
-            <a:off x="1841500" y="1968500"/>
+            <a:off x="2346467" y="2186864"/>
             <a:ext cx="2444750" cy="2444750"/>
           </a:xfrm>
           <a:prstGeom prst="rect">
@@ -30345,99 +30349,99 @@
           </a:lstStyle>
           <a:p>
             <a:r>
-              <a:rPr lang="en-US" dirty="0"/>
+              <a:rPr lang="en-US" sz="2000" dirty="0"/>
               <a:t>The </a:t>
             </a:r>
             <a:r>
-              <a:rPr lang="en-US" b="1" dirty="0"/>
+              <a:rPr lang="en-US" sz="2000" b="1" dirty="0"/>
               <a:t>web container</a:t>
             </a:r>
             <a:r>
-              <a:rPr lang="en-US" dirty="0"/>
+              <a:rPr lang="en-US" sz="2000" dirty="0"/>
               <a:t> is the interface between web components and the web server. </a:t>
             </a:r>
-            <a:endParaRPr lang="en-US" dirty="0" smtClean="0"/>
+            <a:endParaRPr lang="en-US" sz="2000" dirty="0" smtClean="0"/>
           </a:p>
           <a:p>
             <a:pPr marL="0" indent="0">
               <a:buNone/>
             </a:pPr>
-            <a:endParaRPr lang="en-US" dirty="0"/>
-          </a:p>
-          <a:p>
-            <a:r>
-              <a:rPr lang="en-US" dirty="0" smtClean="0"/>
+            <a:endParaRPr lang="en-US" sz="2000" dirty="0"/>
+          </a:p>
+          <a:p>
+            <a:r>
+              <a:rPr lang="en-US" sz="2000" dirty="0" smtClean="0"/>
               <a:t>The </a:t>
             </a:r>
             <a:r>
-              <a:rPr lang="en-US" b="1" dirty="0"/>
+              <a:rPr lang="en-US" sz="2000" b="1" dirty="0"/>
               <a:t>web container </a:t>
             </a:r>
             <a:r>
-              <a:rPr lang="en-US" dirty="0" smtClean="0"/>
+              <a:rPr lang="en-US" sz="2000" dirty="0" smtClean="0"/>
               <a:t>offers:</a:t>
             </a:r>
           </a:p>
           <a:p>
             <a:pPr lvl="1"/>
             <a:r>
-              <a:rPr lang="en-US" dirty="0"/>
+              <a:rPr lang="en-US" sz="2000" dirty="0"/>
               <a:t>Communication </a:t>
             </a:r>
             <a:r>
-              <a:rPr lang="en-US" dirty="0" smtClean="0"/>
+              <a:rPr lang="en-US" sz="2000" dirty="0" smtClean="0"/>
               <a:t>Support</a:t>
             </a:r>
           </a:p>
           <a:p>
             <a:pPr lvl="1"/>
             <a:r>
-              <a:rPr lang="en-US" dirty="0" smtClean="0"/>
+              <a:rPr lang="en-US" sz="2000" dirty="0" smtClean="0"/>
               <a:t>Lifecycle Management</a:t>
             </a:r>
           </a:p>
           <a:p>
             <a:pPr lvl="1"/>
             <a:r>
-              <a:rPr lang="en-US" dirty="0" smtClean="0"/>
+              <a:rPr lang="en-US" sz="2000" dirty="0" smtClean="0"/>
               <a:t>Multi-threading support</a:t>
             </a:r>
-            <a:endParaRPr lang="en-US" dirty="0"/>
+            <a:endParaRPr lang="en-US" sz="2000" dirty="0"/>
           </a:p>
           <a:p>
             <a:pPr lvl="1"/>
             <a:r>
-              <a:rPr lang="en-US" dirty="0" smtClean="0"/>
+              <a:rPr lang="en-US" sz="2000" dirty="0" smtClean="0"/>
               <a:t>Security</a:t>
             </a:r>
-            <a:endParaRPr lang="en-US" dirty="0"/>
+            <a:endParaRPr lang="en-US" sz="2000" dirty="0"/>
           </a:p>
           <a:p>
             <a:pPr lvl="1"/>
             <a:r>
-              <a:rPr lang="en-US" dirty="0"/>
+              <a:rPr lang="en-US" sz="2000" dirty="0"/>
               <a:t>JSP </a:t>
             </a:r>
             <a:r>
-              <a:rPr lang="en-US" dirty="0" smtClean="0"/>
+              <a:rPr lang="en-US" sz="2000" dirty="0" smtClean="0"/>
               <a:t>Support</a:t>
             </a:r>
           </a:p>
           <a:p>
             <a:pPr lvl="1"/>
-            <a:endParaRPr lang="en-US" dirty="0"/>
-          </a:p>
-          <a:p>
-            <a:r>
-              <a:rPr lang="en-US" dirty="0"/>
+            <a:endParaRPr lang="en-US" sz="2000" dirty="0"/>
+          </a:p>
+          <a:p>
+            <a:r>
+              <a:rPr lang="en-US" sz="2000" dirty="0"/>
               <a:t>A </a:t>
             </a:r>
             <a:r>
-              <a:rPr lang="en-US" b="1" dirty="0"/>
+              <a:rPr lang="en-US" sz="2000" b="1" dirty="0"/>
               <a:t>web component</a:t>
             </a:r>
             <a:r>
-              <a:rPr lang="en-US" dirty="0"/>
+              <a:rPr lang="en-US" sz="2000" dirty="0"/>
               <a:t> can be a Servlet, a JSP page, or a Java Server Faces page. </a:t>
             </a:r>
           </a:p>
@@ -31075,15 +31079,6 @@
 </file>
 
 <file path=customXml/item1.xml><?xml version="1.0" encoding="utf-8"?>
-<?mso-contentType ?>
-<FormTemplates xmlns="http://schemas.microsoft.com/sharepoint/v3/contenttype/forms">
-  <Display>DocumentLibraryForm</Display>
-  <Edit>DocumentLibraryForm</Edit>
-  <New>DocumentLibraryForm</New>
-</FormTemplates>
-</file>
-
-<file path=customXml/item2.xml><?xml version="1.0" encoding="utf-8"?>
 <ct:contentTypeSchema xmlns:ct="http://schemas.microsoft.com/office/2006/metadata/contentType" xmlns:ma="http://schemas.microsoft.com/office/2006/metadata/properties/metaAttributes" ct:_="" ma:_="" ma:contentTypeName="Document" ma:contentTypeID="0x0101002EAB9993CCBF73478E12853278F3FB5C" ma:contentTypeVersion="1" ma:contentTypeDescription="Create a new document." ma:contentTypeScope="" ma:versionID="4db10d317033d09fed4d0297d17c663a">
   <xsd:schema xmlns:xsd="http://www.w3.org/2001/XMLSchema" xmlns:xs="http://www.w3.org/2001/XMLSchema" xmlns:p="http://schemas.microsoft.com/office/2006/metadata/properties" xmlns:ns1="http://schemas.microsoft.com/sharepoint/v3" targetNamespace="http://schemas.microsoft.com/office/2006/metadata/properties" ma:root="true" ma:fieldsID="48c5b5cd9b8d25ff6dd15848836f4270" ns1:_="">
     <xsd:import namespace="http://schemas.microsoft.com/sharepoint/v3"/>
@@ -31215,7 +31210,7 @@
 </ct:contentTypeSchema>
 </file>
 
-<file path=customXml/item3.xml><?xml version="1.0" encoding="utf-8"?>
+<file path=customXml/item2.xml><?xml version="1.0" encoding="utf-8"?>
 <p:properties xmlns:p="http://schemas.microsoft.com/office/2006/metadata/properties" xmlns:xsi="http://www.w3.org/2001/XMLSchema-instance" xmlns:pc="http://schemas.microsoft.com/office/infopath/2007/PartnerControls">
   <documentManagement>
     <PublishingExpirationDate xmlns="http://schemas.microsoft.com/sharepoint/v3" xsi:nil="true"/>
@@ -31224,15 +31219,16 @@
 </p:properties>
 </file>
 
-<file path=customXml/itemProps1.xml><?xml version="1.0" encoding="utf-8"?>
-<ds:datastoreItem xmlns:ds="http://schemas.openxmlformats.org/officeDocument/2006/customXml" ds:itemID="{B3E8851E-A513-4DE1-BFEA-60B7444A3522}">
-  <ds:schemaRefs>
-    <ds:schemaRef ds:uri="http://schemas.microsoft.com/sharepoint/v3/contenttype/forms"/>
-  </ds:schemaRefs>
-</ds:datastoreItem>
+<file path=customXml/item3.xml><?xml version="1.0" encoding="utf-8"?>
+<?mso-contentType ?>
+<FormTemplates xmlns="http://schemas.microsoft.com/sharepoint/v3/contenttype/forms">
+  <Display>DocumentLibraryForm</Display>
+  <Edit>DocumentLibraryForm</Edit>
+  <New>DocumentLibraryForm</New>
+</FormTemplates>
 </file>
 
-<file path=customXml/itemProps2.xml><?xml version="1.0" encoding="utf-8"?>
+<file path=customXml/itemProps1.xml><?xml version="1.0" encoding="utf-8"?>
 <ds:datastoreItem xmlns:ds="http://schemas.openxmlformats.org/officeDocument/2006/customXml" ds:itemID="{E29AC310-E4D3-4181-8DC8-8BCBD631C9E0}">
   <ds:schemaRefs>
     <ds:schemaRef ds:uri="http://schemas.microsoft.com/office/2006/metadata/contentType"/>
@@ -31250,7 +31246,7 @@
 </ds:datastoreItem>
 </file>
 
-<file path=customXml/itemProps3.xml><?xml version="1.0" encoding="utf-8"?>
+<file path=customXml/itemProps2.xml><?xml version="1.0" encoding="utf-8"?>
 <ds:datastoreItem xmlns:ds="http://schemas.openxmlformats.org/officeDocument/2006/customXml" ds:itemID="{C1424CC9-255C-4972-B5F2-6F19B32F3DEA}">
   <ds:schemaRefs>
     <ds:schemaRef ds:uri="http://purl.org/dc/terms/"/>
@@ -31264,4 +31260,12 @@
     <ds:schemaRef ds:uri="http://purl.org/dc/dcmitype/"/>
   </ds:schemaRefs>
 </ds:datastoreItem>
+</file>
+
+<file path=customXml/itemProps3.xml><?xml version="1.0" encoding="utf-8"?>
+<ds:datastoreItem xmlns:ds="http://schemas.openxmlformats.org/officeDocument/2006/customXml" ds:itemID="{B3E8851E-A513-4DE1-BFEA-60B7444A3522}">
+  <ds:schemaRefs>
+    <ds:schemaRef ds:uri="http://schemas.microsoft.com/sharepoint/v3/contenttype/forms"/>
+  </ds:schemaRefs>
+</ds:datastoreItem>
 </file>
</xml_diff>